<commit_message>
fix(template): join nameFragments from slide note's first line
</commit_message>
<xml_diff>
--- a/__tests__/pptx-templates/SlideTitles.pptx
+++ b/__tests__/pptx-templates/SlideTitles.pptx
@@ -199,7 +199,7 @@
           <a:p>
             <a:fld id="{52B5D4D8-2CEB-4A1B-A934-76F36437110E}" type="datetimeFigureOut">
               <a:rPr lang="de-DE" smtClean="0"/>
-              <a:t>05.11.2021</a:t>
+              <a:t>09.11.2021</a:t>
             </a:fld>
             <a:endParaRPr lang="de-DE"/>
           </a:p>
@@ -512,9 +512,21 @@
           <a:p>
             <a:r>
               <a:rPr lang="de-DE" sz="1200"/>
-              <a:t>Slide Title 3 from notes</a:t>
-            </a:r>
-            <a:endParaRPr lang="de-DE"/>
+              <a:t>Slide Title 3 from notes </a:t>
+            </a:r>
+            <a:r>
+              <a:rPr lang="de-DE" sz="1200" b="1"/>
+              <a:t>Test</a:t>
+            </a:r>
+          </a:p>
+          <a:p>
+            <a:endParaRPr lang="de-DE" sz="1200" b="1"/>
+          </a:p>
+          <a:p>
+            <a:r>
+              <a:rPr lang="de-DE" b="0"/>
+              <a:t>Everything after first line break will be ignored.</a:t>
+            </a:r>
           </a:p>
         </p:txBody>
       </p:sp>
@@ -701,7 +713,7 @@
           <a:p>
             <a:fld id="{8FB60A0F-5ED1-45ED-A5D5-DB038E6B70D9}" type="datetimeFigureOut">
               <a:rPr lang="de-DE" smtClean="0"/>
-              <a:t>05.11.2021</a:t>
+              <a:t>09.11.2021</a:t>
             </a:fld>
             <a:endParaRPr lang="de-DE"/>
           </a:p>
@@ -899,7 +911,7 @@
           <a:p>
             <a:fld id="{8FB60A0F-5ED1-45ED-A5D5-DB038E6B70D9}" type="datetimeFigureOut">
               <a:rPr lang="de-DE" smtClean="0"/>
-              <a:t>05.11.2021</a:t>
+              <a:t>09.11.2021</a:t>
             </a:fld>
             <a:endParaRPr lang="de-DE"/>
           </a:p>
@@ -1107,7 +1119,7 @@
           <a:p>
             <a:fld id="{8FB60A0F-5ED1-45ED-A5D5-DB038E6B70D9}" type="datetimeFigureOut">
               <a:rPr lang="de-DE" smtClean="0"/>
-              <a:t>05.11.2021</a:t>
+              <a:t>09.11.2021</a:t>
             </a:fld>
             <a:endParaRPr lang="de-DE"/>
           </a:p>
@@ -1305,7 +1317,7 @@
           <a:p>
             <a:fld id="{8FB60A0F-5ED1-45ED-A5D5-DB038E6B70D9}" type="datetimeFigureOut">
               <a:rPr lang="de-DE" smtClean="0"/>
-              <a:t>05.11.2021</a:t>
+              <a:t>09.11.2021</a:t>
             </a:fld>
             <a:endParaRPr lang="de-DE"/>
           </a:p>
@@ -1580,7 +1592,7 @@
           <a:p>
             <a:fld id="{8FB60A0F-5ED1-45ED-A5D5-DB038E6B70D9}" type="datetimeFigureOut">
               <a:rPr lang="de-DE" smtClean="0"/>
-              <a:t>05.11.2021</a:t>
+              <a:t>09.11.2021</a:t>
             </a:fld>
             <a:endParaRPr lang="de-DE"/>
           </a:p>
@@ -1845,7 +1857,7 @@
           <a:p>
             <a:fld id="{8FB60A0F-5ED1-45ED-A5D5-DB038E6B70D9}" type="datetimeFigureOut">
               <a:rPr lang="de-DE" smtClean="0"/>
-              <a:t>05.11.2021</a:t>
+              <a:t>09.11.2021</a:t>
             </a:fld>
             <a:endParaRPr lang="de-DE"/>
           </a:p>
@@ -2257,7 +2269,7 @@
           <a:p>
             <a:fld id="{8FB60A0F-5ED1-45ED-A5D5-DB038E6B70D9}" type="datetimeFigureOut">
               <a:rPr lang="de-DE" smtClean="0"/>
-              <a:t>05.11.2021</a:t>
+              <a:t>09.11.2021</a:t>
             </a:fld>
             <a:endParaRPr lang="de-DE"/>
           </a:p>
@@ -2398,7 +2410,7 @@
           <a:p>
             <a:fld id="{8FB60A0F-5ED1-45ED-A5D5-DB038E6B70D9}" type="datetimeFigureOut">
               <a:rPr lang="de-DE" smtClean="0"/>
-              <a:t>05.11.2021</a:t>
+              <a:t>09.11.2021</a:t>
             </a:fld>
             <a:endParaRPr lang="de-DE"/>
           </a:p>
@@ -2511,7 +2523,7 @@
           <a:p>
             <a:fld id="{8FB60A0F-5ED1-45ED-A5D5-DB038E6B70D9}" type="datetimeFigureOut">
               <a:rPr lang="de-DE" smtClean="0"/>
-              <a:t>05.11.2021</a:t>
+              <a:t>09.11.2021</a:t>
             </a:fld>
             <a:endParaRPr lang="de-DE"/>
           </a:p>
@@ -2822,7 +2834,7 @@
           <a:p>
             <a:fld id="{8FB60A0F-5ED1-45ED-A5D5-DB038E6B70D9}" type="datetimeFigureOut">
               <a:rPr lang="de-DE" smtClean="0"/>
-              <a:t>05.11.2021</a:t>
+              <a:t>09.11.2021</a:t>
             </a:fld>
             <a:endParaRPr lang="de-DE"/>
           </a:p>
@@ -3110,7 +3122,7 @@
           <a:p>
             <a:fld id="{8FB60A0F-5ED1-45ED-A5D5-DB038E6B70D9}" type="datetimeFigureOut">
               <a:rPr lang="de-DE" smtClean="0"/>
-              <a:t>05.11.2021</a:t>
+              <a:t>09.11.2021</a:t>
             </a:fld>
             <a:endParaRPr lang="de-DE"/>
           </a:p>
@@ -3351,7 +3363,7 @@
           <a:p>
             <a:fld id="{8FB60A0F-5ED1-45ED-A5D5-DB038E6B70D9}" type="datetimeFigureOut">
               <a:rPr lang="de-DE" smtClean="0"/>
-              <a:t>05.11.2021</a:t>
+              <a:t>09.11.2021</a:t>
             </a:fld>
             <a:endParaRPr lang="de-DE"/>
           </a:p>

</xml_diff>